<commit_message>
module07 ready for release
</commit_message>
<xml_diff>
--- a/Slides/Lesson 7.2 Invariants and Context Variables.pptx
+++ b/Slides/Lesson 7.2 Invariants and Context Variables.pptx
@@ -240,7 +240,7 @@
           <a:p>
             <a:fld id="{CA5085ED-56B4-45A6-801A-98AC77E76501}" type="datetimeFigureOut">
               <a:rPr lang="en-US" smtClean="0"/>
-              <a:t>10/1/2017</a:t>
+              <a:t>10/2/2017</a:t>
             </a:fld>
             <a:endParaRPr lang="en-US"/>
           </a:p>
@@ -855,7 +855,7 @@
           <a:p>
             <a:fld id="{2F1F79F5-7BEC-496A-AFC7-876E38F64D71}" type="datetime1">
               <a:rPr lang="en-US" smtClean="0"/>
-              <a:t>10/1/2017</a:t>
+              <a:t>10/2/2017</a:t>
             </a:fld>
             <a:endParaRPr lang="en-US"/>
           </a:p>
@@ -950,7 +950,7 @@
           <a:p>
             <a:fld id="{0A05703A-7669-4FEA-9056-25299B4D29D4}" type="datetime1">
               <a:rPr lang="en-US" smtClean="0"/>
-              <a:t>10/1/2017</a:t>
+              <a:t>10/2/2017</a:t>
             </a:fld>
             <a:endParaRPr lang="en-US"/>
           </a:p>
@@ -1225,7 +1225,7 @@
           <a:p>
             <a:fld id="{6E5077B5-BB57-49DB-88CA-226A139E5C01}" type="datetime1">
               <a:rPr lang="en-US" smtClean="0"/>
-              <a:t>10/1/2017</a:t>
+              <a:t>10/2/2017</a:t>
             </a:fld>
             <a:endParaRPr lang="en-US"/>
           </a:p>
@@ -1477,7 +1477,7 @@
           <a:p>
             <a:fld id="{C48D9447-CBD6-49A1-89FD-8512A8CF8999}" type="datetime1">
               <a:rPr lang="en-US" smtClean="0"/>
-              <a:t>10/1/2017</a:t>
+              <a:t>10/2/2017</a:t>
             </a:fld>
             <a:endParaRPr lang="en-US"/>
           </a:p>
@@ -1645,7 +1645,7 @@
           <a:p>
             <a:fld id="{A3639A2A-823D-48B7-9ACE-7FAF42870BA9}" type="datetime1">
               <a:rPr lang="en-US" smtClean="0"/>
-              <a:t>10/1/2017</a:t>
+              <a:t>10/2/2017</a:t>
             </a:fld>
             <a:endParaRPr lang="en-US"/>
           </a:p>
@@ -1823,7 +1823,7 @@
           <a:p>
             <a:fld id="{ED1B6996-82E9-463C-972C-7B56056E426C}" type="datetime1">
               <a:rPr lang="en-US" smtClean="0"/>
-              <a:t>10/1/2017</a:t>
+              <a:t>10/2/2017</a:t>
             </a:fld>
             <a:endParaRPr lang="en-US"/>
           </a:p>
@@ -1997,7 +1997,7 @@
           <a:p>
             <a:fld id="{E22ED4DA-448D-4BB1-B935-CC112220207B}" type="datetime1">
               <a:rPr lang="en-US" smtClean="0"/>
-              <a:t>10/1/2017</a:t>
+              <a:t>10/2/2017</a:t>
             </a:fld>
             <a:endParaRPr lang="en-US"/>
           </a:p>
@@ -2170,7 +2170,7 @@
           <a:p>
             <a:fld id="{E22ED4DA-448D-4BB1-B935-CC112220207B}" type="datetime1">
               <a:rPr lang="en-US" smtClean="0"/>
-              <a:t>10/1/2017</a:t>
+              <a:t>10/2/2017</a:t>
             </a:fld>
             <a:endParaRPr lang="en-US"/>
           </a:p>
@@ -2430,7 +2430,7 @@
           <a:p>
             <a:fld id="{FF5D65A6-AB94-4435-B0B7-3743215FA46C}" type="datetime1">
               <a:rPr lang="en-US" smtClean="0"/>
-              <a:t>10/1/2017</a:t>
+              <a:t>10/2/2017</a:t>
             </a:fld>
             <a:endParaRPr lang="en-US"/>
           </a:p>
@@ -2606,7 +2606,7 @@
           <a:p>
             <a:fld id="{FF5D65A6-AB94-4435-B0B7-3743215FA46C}" type="datetime1">
               <a:rPr lang="en-US" smtClean="0"/>
-              <a:t>10/1/2017</a:t>
+              <a:t>10/2/2017</a:t>
             </a:fld>
             <a:endParaRPr lang="en-US"/>
           </a:p>
@@ -2900,7 +2900,7 @@
           <a:p>
             <a:fld id="{7C193DC4-6EF0-48C9-B29C-616106A645E1}" type="datetime1">
               <a:rPr lang="en-US" smtClean="0"/>
-              <a:t>10/1/2017</a:t>
+              <a:t>10/2/2017</a:t>
             </a:fld>
             <a:endParaRPr lang="en-US"/>
           </a:p>
@@ -3185,7 +3185,7 @@
           <a:p>
             <a:fld id="{5D1846AD-9252-4647-9435-4C2AC365653A}" type="datetime1">
               <a:rPr lang="en-US" smtClean="0"/>
-              <a:t>10/1/2017</a:t>
+              <a:t>10/2/2017</a:t>
             </a:fld>
             <a:endParaRPr lang="en-US"/>
           </a:p>
@@ -3604,7 +3604,7 @@
           <a:p>
             <a:fld id="{CE56DC10-3561-4063-A6AF-C1CC7A41040A}" type="datetime1">
               <a:rPr lang="en-US" smtClean="0"/>
-              <a:t>10/1/2017</a:t>
+              <a:t>10/2/2017</a:t>
             </a:fld>
             <a:endParaRPr lang="en-US"/>
           </a:p>
@@ -3721,7 +3721,7 @@
           <a:p>
             <a:fld id="{2F7B77F5-1464-4F6B-92A8-64FC8A508293}" type="datetime1">
               <a:rPr lang="en-US" smtClean="0"/>
-              <a:t>10/1/2017</a:t>
+              <a:t>10/2/2017</a:t>
             </a:fld>
             <a:endParaRPr lang="en-US"/>
           </a:p>
@@ -3944,7 +3944,7 @@
           <a:p>
             <a:fld id="{02B3F677-983B-48DB-ADFD-63FE6CBC7FB2}" type="datetime1">
               <a:rPr lang="en-US" smtClean="0"/>
-              <a:t>10/1/2017</a:t>
+              <a:t>10/2/2017</a:t>
             </a:fld>
             <a:endParaRPr lang="en-US"/>
           </a:p>
@@ -12136,8 +12136,20 @@
           <a:p>
             <a:r>
               <a:rPr lang="en-US" dirty="0"/>
-              <a:t>Do Guided Practice 7.1</a:t>
-            </a:r>
+              <a:t>Do Guided Practices 7.1 and 7.2 </a:t>
+            </a:r>
+          </a:p>
+          <a:p>
+            <a:pPr lvl="1"/>
+            <a:r>
+              <a:rPr lang="en-US" dirty="0"/>
+              <a:t>Be sure to do GP7.2, since it introduces material not covered in </a:t>
+            </a:r>
+            <a:r>
+              <a:rPr lang="en-US"/>
+              <a:t>the slides!</a:t>
+            </a:r>
+            <a:endParaRPr lang="en-US" dirty="0"/>
           </a:p>
           <a:p>
             <a:r>

</xml_diff>

<commit_message>
fixed typo in L7.2
</commit_message>
<xml_diff>
--- a/Slides/Lesson 7.2 Invariants and Context Variables.pptx
+++ b/Slides/Lesson 7.2 Invariants and Context Variables.pptx
@@ -240,7 +240,7 @@
           <a:p>
             <a:fld id="{CA5085ED-56B4-45A6-801A-98AC77E76501}" type="datetimeFigureOut">
               <a:rPr lang="en-US" smtClean="0"/>
-              <a:t>10/2/2017</a:t>
+              <a:t>10/23/2017</a:t>
             </a:fld>
             <a:endParaRPr lang="en-US"/>
           </a:p>
@@ -855,7 +855,7 @@
           <a:p>
             <a:fld id="{2F1F79F5-7BEC-496A-AFC7-876E38F64D71}" type="datetime1">
               <a:rPr lang="en-US" smtClean="0"/>
-              <a:t>10/2/2017</a:t>
+              <a:t>10/23/2017</a:t>
             </a:fld>
             <a:endParaRPr lang="en-US"/>
           </a:p>
@@ -950,7 +950,7 @@
           <a:p>
             <a:fld id="{0A05703A-7669-4FEA-9056-25299B4D29D4}" type="datetime1">
               <a:rPr lang="en-US" smtClean="0"/>
-              <a:t>10/2/2017</a:t>
+              <a:t>10/23/2017</a:t>
             </a:fld>
             <a:endParaRPr lang="en-US"/>
           </a:p>
@@ -1225,7 +1225,7 @@
           <a:p>
             <a:fld id="{6E5077B5-BB57-49DB-88CA-226A139E5C01}" type="datetime1">
               <a:rPr lang="en-US" smtClean="0"/>
-              <a:t>10/2/2017</a:t>
+              <a:t>10/23/2017</a:t>
             </a:fld>
             <a:endParaRPr lang="en-US"/>
           </a:p>
@@ -1477,7 +1477,7 @@
           <a:p>
             <a:fld id="{C48D9447-CBD6-49A1-89FD-8512A8CF8999}" type="datetime1">
               <a:rPr lang="en-US" smtClean="0"/>
-              <a:t>10/2/2017</a:t>
+              <a:t>10/23/2017</a:t>
             </a:fld>
             <a:endParaRPr lang="en-US"/>
           </a:p>
@@ -1645,7 +1645,7 @@
           <a:p>
             <a:fld id="{A3639A2A-823D-48B7-9ACE-7FAF42870BA9}" type="datetime1">
               <a:rPr lang="en-US" smtClean="0"/>
-              <a:t>10/2/2017</a:t>
+              <a:t>10/23/2017</a:t>
             </a:fld>
             <a:endParaRPr lang="en-US"/>
           </a:p>
@@ -1823,7 +1823,7 @@
           <a:p>
             <a:fld id="{ED1B6996-82E9-463C-972C-7B56056E426C}" type="datetime1">
               <a:rPr lang="en-US" smtClean="0"/>
-              <a:t>10/2/2017</a:t>
+              <a:t>10/23/2017</a:t>
             </a:fld>
             <a:endParaRPr lang="en-US"/>
           </a:p>
@@ -1997,7 +1997,7 @@
           <a:p>
             <a:fld id="{E22ED4DA-448D-4BB1-B935-CC112220207B}" type="datetime1">
               <a:rPr lang="en-US" smtClean="0"/>
-              <a:t>10/2/2017</a:t>
+              <a:t>10/23/2017</a:t>
             </a:fld>
             <a:endParaRPr lang="en-US"/>
           </a:p>
@@ -2170,7 +2170,7 @@
           <a:p>
             <a:fld id="{E22ED4DA-448D-4BB1-B935-CC112220207B}" type="datetime1">
               <a:rPr lang="en-US" smtClean="0"/>
-              <a:t>10/2/2017</a:t>
+              <a:t>10/23/2017</a:t>
             </a:fld>
             <a:endParaRPr lang="en-US"/>
           </a:p>
@@ -2430,7 +2430,7 @@
           <a:p>
             <a:fld id="{FF5D65A6-AB94-4435-B0B7-3743215FA46C}" type="datetime1">
               <a:rPr lang="en-US" smtClean="0"/>
-              <a:t>10/2/2017</a:t>
+              <a:t>10/23/2017</a:t>
             </a:fld>
             <a:endParaRPr lang="en-US"/>
           </a:p>
@@ -2606,7 +2606,7 @@
           <a:p>
             <a:fld id="{FF5D65A6-AB94-4435-B0B7-3743215FA46C}" type="datetime1">
               <a:rPr lang="en-US" smtClean="0"/>
-              <a:t>10/2/2017</a:t>
+              <a:t>10/23/2017</a:t>
             </a:fld>
             <a:endParaRPr lang="en-US"/>
           </a:p>
@@ -2900,7 +2900,7 @@
           <a:p>
             <a:fld id="{7C193DC4-6EF0-48C9-B29C-616106A645E1}" type="datetime1">
               <a:rPr lang="en-US" smtClean="0"/>
-              <a:t>10/2/2017</a:t>
+              <a:t>10/23/2017</a:t>
             </a:fld>
             <a:endParaRPr lang="en-US"/>
           </a:p>
@@ -3185,7 +3185,7 @@
           <a:p>
             <a:fld id="{5D1846AD-9252-4647-9435-4C2AC365653A}" type="datetime1">
               <a:rPr lang="en-US" smtClean="0"/>
-              <a:t>10/2/2017</a:t>
+              <a:t>10/23/2017</a:t>
             </a:fld>
             <a:endParaRPr lang="en-US"/>
           </a:p>
@@ -3604,7 +3604,7 @@
           <a:p>
             <a:fld id="{CE56DC10-3561-4063-A6AF-C1CC7A41040A}" type="datetime1">
               <a:rPr lang="en-US" smtClean="0"/>
-              <a:t>10/2/2017</a:t>
+              <a:t>10/23/2017</a:t>
             </a:fld>
             <a:endParaRPr lang="en-US"/>
           </a:p>
@@ -3721,7 +3721,7 @@
           <a:p>
             <a:fld id="{2F7B77F5-1464-4F6B-92A8-64FC8A508293}" type="datetime1">
               <a:rPr lang="en-US" smtClean="0"/>
-              <a:t>10/2/2017</a:t>
+              <a:t>10/23/2017</a:t>
             </a:fld>
             <a:endParaRPr lang="en-US"/>
           </a:p>
@@ -3944,7 +3944,7 @@
           <a:p>
             <a:fld id="{02B3F677-983B-48DB-ADFD-63FE6CBC7FB2}" type="datetime1">
               <a:rPr lang="en-US" smtClean="0"/>
-              <a:t>10/2/2017</a:t>
+              <a:t>10/23/2017</a:t>
             </a:fld>
             <a:endParaRPr lang="en-US"/>
           </a:p>
@@ -5953,6 +5953,13 @@
                 <a:cs typeface="Consolas" pitchFamily="49" charset="0"/>
               </a:rPr>
               <a:t>bintree</a:t>
+            </a:r>
+            <a:r>
+              <a:rPr lang="en-US" sz="1800" b="1">
+                <a:latin typeface="Consolas" pitchFamily="49" charset="0"/>
+                <a:cs typeface="Consolas" pitchFamily="49" charset="0"/>
+              </a:rPr>
+              <a:t>-node</a:t>
             </a:r>
             <a:endParaRPr lang="en-US" sz="1800" b="1" dirty="0">
               <a:latin typeface="Consolas" pitchFamily="49" charset="0"/>

</xml_diff>